<commit_message>
build: regenerate all 12 session PPTX decks
Rebuild all slide decks to incorporate HTML quality fixes,
content additions, and layout corrections.
</commit_message>
<xml_diff>
--- a/sessions/session-01/slides.pptx
+++ b/sessions/session-01/slides.pptx
@@ -6906,11 +6906,11 @@
         <p:spPr>
           <a:xfrm>
             <a:off x="355550" y="2009626"/>
-            <a:ext cx="8432899" cy="460921"/>
+            <a:ext cx="8432899" cy="482501"/>
           </a:xfrm>
           <a:prstGeom prst="roundRect">
             <a:avLst>
-              <a:gd name="adj" fmla="val 13777"/>
+              <a:gd name="adj" fmla="val 13161"/>
             </a:avLst>
           </a:prstGeom>
           <a:solidFill>
@@ -6937,12 +6937,12 @@
         </p:nvSpPr>
         <p:spPr>
           <a:xfrm>
-            <a:off x="507950" y="2087612"/>
-            <a:ext cx="330101" cy="304800"/>
+            <a:off x="507950" y="2085826"/>
+            <a:ext cx="330101" cy="330101"/>
           </a:xfrm>
           <a:prstGeom prst="roundRect">
             <a:avLst>
-              <a:gd name="adj" fmla="val 300000"/>
+              <a:gd name="adj" fmla="val 277006"/>
             </a:avLst>
           </a:prstGeom>
           <a:solidFill>
@@ -6969,7 +6969,7 @@
         </p:nvSpPr>
         <p:spPr>
           <a:xfrm>
-            <a:off x="585639" y="2085826"/>
+            <a:off x="585639" y="2096542"/>
             <a:ext cx="178219" cy="308521"/>
           </a:xfrm>
           <a:prstGeom prst="rect">
@@ -7011,7 +7011,7 @@
         </p:nvSpPr>
         <p:spPr>
           <a:xfrm>
-            <a:off x="965002" y="2085826"/>
+            <a:off x="965002" y="2096542"/>
             <a:ext cx="3382816" cy="308521"/>
           </a:xfrm>
           <a:prstGeom prst="rect">
@@ -7053,12 +7053,12 @@
         </p:nvSpPr>
         <p:spPr>
           <a:xfrm>
-            <a:off x="355550" y="2546747"/>
-            <a:ext cx="8432899" cy="460921"/>
+            <a:off x="355550" y="2568327"/>
+            <a:ext cx="8432899" cy="482501"/>
           </a:xfrm>
           <a:prstGeom prst="roundRect">
             <a:avLst>
-              <a:gd name="adj" fmla="val 13777"/>
+              <a:gd name="adj" fmla="val 13161"/>
             </a:avLst>
           </a:prstGeom>
           <a:solidFill>
@@ -7085,12 +7085,12 @@
         </p:nvSpPr>
         <p:spPr>
           <a:xfrm>
-            <a:off x="507950" y="2624733"/>
-            <a:ext cx="330101" cy="304800"/>
+            <a:off x="507950" y="2644527"/>
+            <a:ext cx="330101" cy="330101"/>
           </a:xfrm>
           <a:prstGeom prst="roundRect">
             <a:avLst>
-              <a:gd name="adj" fmla="val 300000"/>
+              <a:gd name="adj" fmla="val 277006"/>
             </a:avLst>
           </a:prstGeom>
           <a:solidFill>
@@ -7117,7 +7117,7 @@
         </p:nvSpPr>
         <p:spPr>
           <a:xfrm>
-            <a:off x="585639" y="2622947"/>
+            <a:off x="585639" y="2655243"/>
             <a:ext cx="178219" cy="308521"/>
           </a:xfrm>
           <a:prstGeom prst="rect">
@@ -7159,7 +7159,7 @@
         </p:nvSpPr>
         <p:spPr>
           <a:xfrm>
-            <a:off x="965002" y="2622947"/>
+            <a:off x="965002" y="2655243"/>
             <a:ext cx="4704883" cy="308521"/>
           </a:xfrm>
           <a:prstGeom prst="rect">
@@ -7201,12 +7201,12 @@
         </p:nvSpPr>
         <p:spPr>
           <a:xfrm>
-            <a:off x="355550" y="3083868"/>
-            <a:ext cx="8432899" cy="460921"/>
+            <a:off x="355550" y="3127028"/>
+            <a:ext cx="8432899" cy="482501"/>
           </a:xfrm>
           <a:prstGeom prst="roundRect">
             <a:avLst>
-              <a:gd name="adj" fmla="val 13777"/>
+              <a:gd name="adj" fmla="val 13161"/>
             </a:avLst>
           </a:prstGeom>
           <a:solidFill>
@@ -7233,12 +7233,12 @@
         </p:nvSpPr>
         <p:spPr>
           <a:xfrm>
-            <a:off x="507950" y="3161854"/>
-            <a:ext cx="330101" cy="304800"/>
+            <a:off x="507950" y="3203228"/>
+            <a:ext cx="330101" cy="330101"/>
           </a:xfrm>
           <a:prstGeom prst="roundRect">
             <a:avLst>
-              <a:gd name="adj" fmla="val 300000"/>
+              <a:gd name="adj" fmla="val 277006"/>
             </a:avLst>
           </a:prstGeom>
           <a:solidFill>
@@ -7265,7 +7265,7 @@
         </p:nvSpPr>
         <p:spPr>
           <a:xfrm>
-            <a:off x="585639" y="3160068"/>
+            <a:off x="585639" y="3213943"/>
             <a:ext cx="178219" cy="308521"/>
           </a:xfrm>
           <a:prstGeom prst="rect">
@@ -7307,7 +7307,7 @@
         </p:nvSpPr>
         <p:spPr>
           <a:xfrm>
-            <a:off x="965002" y="3160068"/>
+            <a:off x="965002" y="3213943"/>
             <a:ext cx="2981748" cy="308521"/>
           </a:xfrm>
           <a:prstGeom prst="rect">
@@ -7349,12 +7349,12 @@
         </p:nvSpPr>
         <p:spPr>
           <a:xfrm>
-            <a:off x="355550" y="3620988"/>
-            <a:ext cx="8432899" cy="460921"/>
+            <a:off x="355550" y="3685729"/>
+            <a:ext cx="8432899" cy="482501"/>
           </a:xfrm>
           <a:prstGeom prst="roundRect">
             <a:avLst>
-              <a:gd name="adj" fmla="val 13777"/>
+              <a:gd name="adj" fmla="val 13161"/>
             </a:avLst>
           </a:prstGeom>
           <a:solidFill>
@@ -7381,12 +7381,12 @@
         </p:nvSpPr>
         <p:spPr>
           <a:xfrm>
-            <a:off x="507950" y="3698974"/>
-            <a:ext cx="330101" cy="304800"/>
+            <a:off x="507950" y="3761929"/>
+            <a:ext cx="330101" cy="330101"/>
           </a:xfrm>
           <a:prstGeom prst="roundRect">
             <a:avLst>
-              <a:gd name="adj" fmla="val 300000"/>
+              <a:gd name="adj" fmla="val 277006"/>
             </a:avLst>
           </a:prstGeom>
           <a:solidFill>
@@ -7413,7 +7413,7 @@
         </p:nvSpPr>
         <p:spPr>
           <a:xfrm>
-            <a:off x="585639" y="3697188"/>
+            <a:off x="585639" y="3772644"/>
             <a:ext cx="178219" cy="308521"/>
           </a:xfrm>
           <a:prstGeom prst="rect">
@@ -7455,7 +7455,7 @@
         </p:nvSpPr>
         <p:spPr>
           <a:xfrm>
-            <a:off x="965002" y="3697188"/>
+            <a:off x="965002" y="3772644"/>
             <a:ext cx="3097575" cy="308521"/>
           </a:xfrm>
           <a:prstGeom prst="rect">
@@ -7497,7 +7497,7 @@
         </p:nvSpPr>
         <p:spPr>
           <a:xfrm>
-            <a:off x="355550" y="4183410"/>
+            <a:off x="355550" y="4269730"/>
             <a:ext cx="8601557" cy="325636"/>
           </a:xfrm>
           <a:prstGeom prst="rect">

</xml_diff>